<commit_message>
Actualización SCADA - celda Robotica
</commit_message>
<xml_diff>
--- a/assets/img/Comunicaciones.pptx
+++ b/assets/img/Comunicaciones.pptx
@@ -107,6 +107,11 @@
       </a:defRPr>
     </a:lvl9pPr>
   </p:defaultTextStyle>
+  <p:extLst>
+    <p:ext uri="{EFAFB233-063F-42B5-8137-9DF3F51BA10A}">
+      <p15:sldGuideLst xmlns:p15="http://schemas.microsoft.com/office/powerpoint/2012/main"/>
+    </p:ext>
+  </p:extLst>
 </p:presentation>
 </file>
 
@@ -3759,8 +3764,8 @@
         </p:blipFill>
         <p:spPr>
           <a:xfrm>
-            <a:off x="3614021" y="878605"/>
-            <a:ext cx="1252193" cy="556530"/>
+            <a:off x="3421139" y="868156"/>
+            <a:ext cx="910831" cy="404814"/>
           </a:xfrm>
           <a:prstGeom prst="rect">
             <a:avLst/>
@@ -4670,6 +4675,84 @@
           </a:p>
         </p:txBody>
       </p:sp>
+      <p:pic>
+        <p:nvPicPr>
+          <p:cNvPr id="3" name="Imagen 2" descr="Icono&#10;&#10;Descripción generada automáticamente">
+            <a:extLst>
+              <a:ext uri="{FF2B5EF4-FFF2-40B4-BE49-F238E27FC236}">
+                <a16:creationId xmlns:a16="http://schemas.microsoft.com/office/drawing/2014/main" id="{FB3F5F54-BA46-46F8-825C-35C58EA806C1}"/>
+              </a:ext>
+            </a:extLst>
+          </p:cNvPr>
+          <p:cNvPicPr>
+            <a:picLocks noChangeAspect="1"/>
+          </p:cNvPicPr>
+          <p:nvPr/>
+        </p:nvPicPr>
+        <p:blipFill rotWithShape="1">
+          <a:blip r:embed="rId8">
+            <a:extLst>
+              <a:ext uri="{28A0092B-C50C-407E-A947-70E740481C1C}">
+                <a14:useLocalDpi xmlns:a14="http://schemas.microsoft.com/office/drawing/2010/main" val="0"/>
+              </a:ext>
+            </a:extLst>
+          </a:blip>
+          <a:srcRect b="18023"/>
+          <a:stretch/>
+        </p:blipFill>
+        <p:spPr>
+          <a:xfrm>
+            <a:off x="4435114" y="666759"/>
+            <a:ext cx="910831" cy="746670"/>
+          </a:xfrm>
+          <a:prstGeom prst="rect">
+            <a:avLst/>
+          </a:prstGeom>
+        </p:spPr>
+      </p:pic>
+      <p:cxnSp>
+        <p:nvCxnSpPr>
+          <p:cNvPr id="29" name="Conector recto 28">
+            <a:extLst>
+              <a:ext uri="{FF2B5EF4-FFF2-40B4-BE49-F238E27FC236}">
+                <a16:creationId xmlns:a16="http://schemas.microsoft.com/office/drawing/2014/main" id="{80B8C694-66D5-4BEB-9F72-B573EDD35B81}"/>
+              </a:ext>
+            </a:extLst>
+          </p:cNvPr>
+          <p:cNvCxnSpPr>
+            <a:cxnSpLocks/>
+          </p:cNvCxnSpPr>
+          <p:nvPr/>
+        </p:nvCxnSpPr>
+        <p:spPr>
+          <a:xfrm flipH="1" flipV="1">
+            <a:off x="4890530" y="1446505"/>
+            <a:ext cx="3579" cy="232306"/>
+          </a:xfrm>
+          <a:prstGeom prst="line">
+            <a:avLst/>
+          </a:prstGeom>
+          <a:ln w="38100">
+            <a:solidFill>
+              <a:schemeClr val="tx1"/>
+            </a:solidFill>
+          </a:ln>
+        </p:spPr>
+        <p:style>
+          <a:lnRef idx="1">
+            <a:schemeClr val="accent1"/>
+          </a:lnRef>
+          <a:fillRef idx="0">
+            <a:schemeClr val="accent1"/>
+          </a:fillRef>
+          <a:effectRef idx="0">
+            <a:schemeClr val="accent1"/>
+          </a:effectRef>
+          <a:fontRef idx="minor">
+            <a:schemeClr val="tx1"/>
+          </a:fontRef>
+        </p:style>
+      </p:cxnSp>
     </p:spTree>
     <p:extLst>
       <p:ext uri="{BB962C8B-B14F-4D97-AF65-F5344CB8AC3E}">

</xml_diff>